<commit_message>
doc: fix text extract, add -nopgbrk option
</commit_message>
<xml_diff>
--- a/doc/ooxml/testdata/hello.pptx
+++ b/doc/ooxml/testdata/hello.pptx
@@ -6,6 +6,15 @@
   </p:sldMasterIdLst>
   <p:sldIdLst>
     <p:sldId id="256" r:id="rId2"/>
+    <p:sldId id="257" r:id="rId3"/>
+    <p:sldId id="258" r:id="rId4"/>
+    <p:sldId id="259" r:id="rId5"/>
+    <p:sldId id="260" r:id="rId6"/>
+    <p:sldId id="261" r:id="rId7"/>
+    <p:sldId id="262" r:id="rId8"/>
+    <p:sldId id="263" r:id="rId9"/>
+    <p:sldId id="264" r:id="rId10"/>
+    <p:sldId id="265" r:id="rId11"/>
   </p:sldIdLst>
   <p:sldSz cx="9144000" cy="6858000" type="screen4x3"/>
   <p:notesSz cx="6858000" cy="9144000"/>
@@ -302,7 +311,7 @@
           <a:p>
             <a:fld id="{60D6F265-8666-467F-8242-7A58C29E99B0}" type="datetimeFigureOut">
               <a:rPr kumimoji="1" lang="ja-JP" altLang="en-US" smtClean="0"/>
-              <a:t>2023/12/23</a:t>
+              <a:t>2024/10/5</a:t>
             </a:fld>
             <a:endParaRPr kumimoji="1" lang="ja-JP" altLang="en-US"/>
           </a:p>
@@ -502,7 +511,7 @@
           <a:p>
             <a:fld id="{60D6F265-8666-467F-8242-7A58C29E99B0}" type="datetimeFigureOut">
               <a:rPr kumimoji="1" lang="ja-JP" altLang="en-US" smtClean="0"/>
-              <a:t>2023/12/23</a:t>
+              <a:t>2024/10/5</a:t>
             </a:fld>
             <a:endParaRPr kumimoji="1" lang="ja-JP" altLang="en-US"/>
           </a:p>
@@ -712,7 +721,7 @@
           <a:p>
             <a:fld id="{60D6F265-8666-467F-8242-7A58C29E99B0}" type="datetimeFigureOut">
               <a:rPr kumimoji="1" lang="ja-JP" altLang="en-US" smtClean="0"/>
-              <a:t>2023/12/23</a:t>
+              <a:t>2024/10/5</a:t>
             </a:fld>
             <a:endParaRPr kumimoji="1" lang="ja-JP" altLang="en-US"/>
           </a:p>
@@ -912,7 +921,7 @@
           <a:p>
             <a:fld id="{60D6F265-8666-467F-8242-7A58C29E99B0}" type="datetimeFigureOut">
               <a:rPr kumimoji="1" lang="ja-JP" altLang="en-US" smtClean="0"/>
-              <a:t>2023/12/23</a:t>
+              <a:t>2024/10/5</a:t>
             </a:fld>
             <a:endParaRPr kumimoji="1" lang="ja-JP" altLang="en-US"/>
           </a:p>
@@ -1157,7 +1166,7 @@
           <a:p>
             <a:fld id="{60D6F265-8666-467F-8242-7A58C29E99B0}" type="datetimeFigureOut">
               <a:rPr kumimoji="1" lang="ja-JP" altLang="en-US" smtClean="0"/>
-              <a:t>2023/12/23</a:t>
+              <a:t>2024/10/5</a:t>
             </a:fld>
             <a:endParaRPr kumimoji="1" lang="ja-JP" altLang="en-US"/>
           </a:p>
@@ -1506,7 +1515,7 @@
           <a:p>
             <a:fld id="{60D6F265-8666-467F-8242-7A58C29E99B0}" type="datetimeFigureOut">
               <a:rPr kumimoji="1" lang="ja-JP" altLang="en-US" smtClean="0"/>
-              <a:t>2023/12/23</a:t>
+              <a:t>2024/10/5</a:t>
             </a:fld>
             <a:endParaRPr kumimoji="1" lang="ja-JP" altLang="en-US"/>
           </a:p>
@@ -1989,7 +1998,7 @@
           <a:p>
             <a:fld id="{60D6F265-8666-467F-8242-7A58C29E99B0}" type="datetimeFigureOut">
               <a:rPr kumimoji="1" lang="ja-JP" altLang="en-US" smtClean="0"/>
-              <a:t>2023/12/23</a:t>
+              <a:t>2024/10/5</a:t>
             </a:fld>
             <a:endParaRPr kumimoji="1" lang="ja-JP" altLang="en-US"/>
           </a:p>
@@ -2106,7 +2115,7 @@
           <a:p>
             <a:fld id="{60D6F265-8666-467F-8242-7A58C29E99B0}" type="datetimeFigureOut">
               <a:rPr kumimoji="1" lang="ja-JP" altLang="en-US" smtClean="0"/>
-              <a:t>2023/12/23</a:t>
+              <a:t>2024/10/5</a:t>
             </a:fld>
             <a:endParaRPr kumimoji="1" lang="ja-JP" altLang="en-US"/>
           </a:p>
@@ -2201,7 +2210,7 @@
           <a:p>
             <a:fld id="{60D6F265-8666-467F-8242-7A58C29E99B0}" type="datetimeFigureOut">
               <a:rPr kumimoji="1" lang="ja-JP" altLang="en-US" smtClean="0"/>
-              <a:t>2023/12/23</a:t>
+              <a:t>2024/10/5</a:t>
             </a:fld>
             <a:endParaRPr kumimoji="1" lang="ja-JP" altLang="en-US"/>
           </a:p>
@@ -2508,7 +2517,7 @@
           <a:p>
             <a:fld id="{60D6F265-8666-467F-8242-7A58C29E99B0}" type="datetimeFigureOut">
               <a:rPr kumimoji="1" lang="ja-JP" altLang="en-US" smtClean="0"/>
-              <a:t>2023/12/23</a:t>
+              <a:t>2024/10/5</a:t>
             </a:fld>
             <a:endParaRPr kumimoji="1" lang="ja-JP" altLang="en-US"/>
           </a:p>
@@ -2760,7 +2769,7 @@
           <a:p>
             <a:fld id="{60D6F265-8666-467F-8242-7A58C29E99B0}" type="datetimeFigureOut">
               <a:rPr kumimoji="1" lang="ja-JP" altLang="en-US" smtClean="0"/>
-              <a:t>2023/12/23</a:t>
+              <a:t>2024/10/5</a:t>
             </a:fld>
             <a:endParaRPr kumimoji="1" lang="ja-JP" altLang="en-US"/>
           </a:p>
@@ -3003,7 +3012,7 @@
           <a:p>
             <a:fld id="{60D6F265-8666-467F-8242-7A58C29E99B0}" type="datetimeFigureOut">
               <a:rPr kumimoji="1" lang="ja-JP" altLang="en-US" smtClean="0"/>
-              <a:t>2023/12/23</a:t>
+              <a:t>2024/10/5</a:t>
             </a:fld>
             <a:endParaRPr kumimoji="1" lang="ja-JP" altLang="en-US"/>
           </a:p>
@@ -3516,6 +3525,762 @@
     <p:extLst>
       <p:ext uri="{BB962C8B-B14F-4D97-AF65-F5344CB8AC3E}">
         <p14:creationId xmlns:p14="http://schemas.microsoft.com/office/powerpoint/2010/main" val="471519352"/>
+      </p:ext>
+    </p:extLst>
+  </p:cSld>
+  <p:clrMapOvr>
+    <a:masterClrMapping/>
+  </p:clrMapOvr>
+</p:sld>
+</file>
+
+<file path=ppt/slides/slide10.xml><?xml version="1.0" encoding="utf-8"?>
+<p:sld xmlns:a="http://schemas.openxmlformats.org/drawingml/2006/main" xmlns:r="http://schemas.openxmlformats.org/officeDocument/2006/relationships" xmlns:p="http://schemas.openxmlformats.org/presentationml/2006/main">
+  <p:cSld>
+    <p:spTree>
+      <p:nvGrpSpPr>
+        <p:cNvPr id="1" name=""/>
+        <p:cNvGrpSpPr/>
+        <p:nvPr/>
+      </p:nvGrpSpPr>
+      <p:grpSpPr>
+        <a:xfrm>
+          <a:off x="0" y="0"/>
+          <a:ext cx="0" cy="0"/>
+          <a:chOff x="0" y="0"/>
+          <a:chExt cx="0" cy="0"/>
+        </a:xfrm>
+      </p:grpSpPr>
+      <p:sp>
+        <p:nvSpPr>
+          <p:cNvPr id="2" name="Title 1">
+            <a:extLst>
+              <a:ext uri="{FF2B5EF4-FFF2-40B4-BE49-F238E27FC236}">
+                <a16:creationId xmlns:a16="http://schemas.microsoft.com/office/drawing/2014/main" id="{3583637B-5763-DD94-E8BE-FCD450DF3B15}"/>
+              </a:ext>
+            </a:extLst>
+          </p:cNvPr>
+          <p:cNvSpPr>
+            <a:spLocks noGrp="1"/>
+          </p:cNvSpPr>
+          <p:nvPr>
+            <p:ph type="title"/>
+          </p:nvPr>
+        </p:nvSpPr>
+        <p:spPr/>
+        <p:txBody>
+          <a:bodyPr/>
+          <a:lstStyle/>
+          <a:p>
+            <a:endParaRPr kumimoji="1" lang="ja-JP" altLang="en-US"/>
+          </a:p>
+        </p:txBody>
+      </p:sp>
+      <p:sp>
+        <p:nvSpPr>
+          <p:cNvPr id="3" name="Content Placeholder 2">
+            <a:extLst>
+              <a:ext uri="{FF2B5EF4-FFF2-40B4-BE49-F238E27FC236}">
+                <a16:creationId xmlns:a16="http://schemas.microsoft.com/office/drawing/2014/main" id="{64B29FFC-4AC0-13CB-1FA9-9FBC33C2C910}"/>
+              </a:ext>
+            </a:extLst>
+          </p:cNvPr>
+          <p:cNvSpPr>
+            <a:spLocks noGrp="1"/>
+          </p:cNvSpPr>
+          <p:nvPr>
+            <p:ph idx="1"/>
+          </p:nvPr>
+        </p:nvSpPr>
+        <p:spPr/>
+        <p:txBody>
+          <a:bodyPr/>
+          <a:lstStyle/>
+          <a:p>
+            <a:r>
+              <a:rPr kumimoji="1" lang="en-US" altLang="ja-JP" dirty="0"/>
+              <a:t>This is slide 10.</a:t>
+            </a:r>
+            <a:endParaRPr kumimoji="1" lang="ja-JP" altLang="en-US" dirty="0"/>
+          </a:p>
+        </p:txBody>
+      </p:sp>
+    </p:spTree>
+    <p:extLst>
+      <p:ext uri="{BB962C8B-B14F-4D97-AF65-F5344CB8AC3E}">
+        <p14:creationId xmlns:p14="http://schemas.microsoft.com/office/powerpoint/2010/main" val="2591911917"/>
+      </p:ext>
+    </p:extLst>
+  </p:cSld>
+  <p:clrMapOvr>
+    <a:masterClrMapping/>
+  </p:clrMapOvr>
+</p:sld>
+</file>
+
+<file path=ppt/slides/slide2.xml><?xml version="1.0" encoding="utf-8"?>
+<p:sld xmlns:a="http://schemas.openxmlformats.org/drawingml/2006/main" xmlns:r="http://schemas.openxmlformats.org/officeDocument/2006/relationships" xmlns:p="http://schemas.openxmlformats.org/presentationml/2006/main">
+  <p:cSld>
+    <p:spTree>
+      <p:nvGrpSpPr>
+        <p:cNvPr id="1" name=""/>
+        <p:cNvGrpSpPr/>
+        <p:nvPr/>
+      </p:nvGrpSpPr>
+      <p:grpSpPr>
+        <a:xfrm>
+          <a:off x="0" y="0"/>
+          <a:ext cx="0" cy="0"/>
+          <a:chOff x="0" y="0"/>
+          <a:chExt cx="0" cy="0"/>
+        </a:xfrm>
+      </p:grpSpPr>
+      <p:sp>
+        <p:nvSpPr>
+          <p:cNvPr id="2" name="Title 1">
+            <a:extLst>
+              <a:ext uri="{FF2B5EF4-FFF2-40B4-BE49-F238E27FC236}">
+                <a16:creationId xmlns:a16="http://schemas.microsoft.com/office/drawing/2014/main" id="{3583637B-5763-DD94-E8BE-FCD450DF3B15}"/>
+              </a:ext>
+            </a:extLst>
+          </p:cNvPr>
+          <p:cNvSpPr>
+            <a:spLocks noGrp="1"/>
+          </p:cNvSpPr>
+          <p:nvPr>
+            <p:ph type="title"/>
+          </p:nvPr>
+        </p:nvSpPr>
+        <p:spPr/>
+        <p:txBody>
+          <a:bodyPr/>
+          <a:lstStyle/>
+          <a:p>
+            <a:endParaRPr kumimoji="1" lang="ja-JP" altLang="en-US"/>
+          </a:p>
+        </p:txBody>
+      </p:sp>
+      <p:sp>
+        <p:nvSpPr>
+          <p:cNvPr id="3" name="Content Placeholder 2">
+            <a:extLst>
+              <a:ext uri="{FF2B5EF4-FFF2-40B4-BE49-F238E27FC236}">
+                <a16:creationId xmlns:a16="http://schemas.microsoft.com/office/drawing/2014/main" id="{64B29FFC-4AC0-13CB-1FA9-9FBC33C2C910}"/>
+              </a:ext>
+            </a:extLst>
+          </p:cNvPr>
+          <p:cNvSpPr>
+            <a:spLocks noGrp="1"/>
+          </p:cNvSpPr>
+          <p:nvPr>
+            <p:ph idx="1"/>
+          </p:nvPr>
+        </p:nvSpPr>
+        <p:spPr/>
+        <p:txBody>
+          <a:bodyPr/>
+          <a:lstStyle/>
+          <a:p>
+            <a:r>
+              <a:rPr kumimoji="1" lang="en-US" altLang="ja-JP" dirty="0"/>
+              <a:t>This is slide 2.</a:t>
+            </a:r>
+            <a:endParaRPr kumimoji="1" lang="ja-JP" altLang="en-US" dirty="0"/>
+          </a:p>
+        </p:txBody>
+      </p:sp>
+    </p:spTree>
+    <p:extLst>
+      <p:ext uri="{BB962C8B-B14F-4D97-AF65-F5344CB8AC3E}">
+        <p14:creationId xmlns:p14="http://schemas.microsoft.com/office/powerpoint/2010/main" val="2028143383"/>
+      </p:ext>
+    </p:extLst>
+  </p:cSld>
+  <p:clrMapOvr>
+    <a:masterClrMapping/>
+  </p:clrMapOvr>
+</p:sld>
+</file>
+
+<file path=ppt/slides/slide3.xml><?xml version="1.0" encoding="utf-8"?>
+<p:sld xmlns:a="http://schemas.openxmlformats.org/drawingml/2006/main" xmlns:r="http://schemas.openxmlformats.org/officeDocument/2006/relationships" xmlns:p="http://schemas.openxmlformats.org/presentationml/2006/main">
+  <p:cSld>
+    <p:spTree>
+      <p:nvGrpSpPr>
+        <p:cNvPr id="1" name=""/>
+        <p:cNvGrpSpPr/>
+        <p:nvPr/>
+      </p:nvGrpSpPr>
+      <p:grpSpPr>
+        <a:xfrm>
+          <a:off x="0" y="0"/>
+          <a:ext cx="0" cy="0"/>
+          <a:chOff x="0" y="0"/>
+          <a:chExt cx="0" cy="0"/>
+        </a:xfrm>
+      </p:grpSpPr>
+      <p:sp>
+        <p:nvSpPr>
+          <p:cNvPr id="2" name="Title 1">
+            <a:extLst>
+              <a:ext uri="{FF2B5EF4-FFF2-40B4-BE49-F238E27FC236}">
+                <a16:creationId xmlns:a16="http://schemas.microsoft.com/office/drawing/2014/main" id="{3583637B-5763-DD94-E8BE-FCD450DF3B15}"/>
+              </a:ext>
+            </a:extLst>
+          </p:cNvPr>
+          <p:cNvSpPr>
+            <a:spLocks noGrp="1"/>
+          </p:cNvSpPr>
+          <p:nvPr>
+            <p:ph type="title"/>
+          </p:nvPr>
+        </p:nvSpPr>
+        <p:spPr/>
+        <p:txBody>
+          <a:bodyPr/>
+          <a:lstStyle/>
+          <a:p>
+            <a:endParaRPr kumimoji="1" lang="ja-JP" altLang="en-US"/>
+          </a:p>
+        </p:txBody>
+      </p:sp>
+      <p:sp>
+        <p:nvSpPr>
+          <p:cNvPr id="3" name="Content Placeholder 2">
+            <a:extLst>
+              <a:ext uri="{FF2B5EF4-FFF2-40B4-BE49-F238E27FC236}">
+                <a16:creationId xmlns:a16="http://schemas.microsoft.com/office/drawing/2014/main" id="{64B29FFC-4AC0-13CB-1FA9-9FBC33C2C910}"/>
+              </a:ext>
+            </a:extLst>
+          </p:cNvPr>
+          <p:cNvSpPr>
+            <a:spLocks noGrp="1"/>
+          </p:cNvSpPr>
+          <p:nvPr>
+            <p:ph idx="1"/>
+          </p:nvPr>
+        </p:nvSpPr>
+        <p:spPr/>
+        <p:txBody>
+          <a:bodyPr/>
+          <a:lstStyle/>
+          <a:p>
+            <a:r>
+              <a:rPr kumimoji="1" lang="en-US" altLang="ja-JP" dirty="0"/>
+              <a:t>This is slide 3.</a:t>
+            </a:r>
+            <a:endParaRPr kumimoji="1" lang="ja-JP" altLang="en-US" dirty="0"/>
+          </a:p>
+        </p:txBody>
+      </p:sp>
+    </p:spTree>
+    <p:extLst>
+      <p:ext uri="{BB962C8B-B14F-4D97-AF65-F5344CB8AC3E}">
+        <p14:creationId xmlns:p14="http://schemas.microsoft.com/office/powerpoint/2010/main" val="522504762"/>
+      </p:ext>
+    </p:extLst>
+  </p:cSld>
+  <p:clrMapOvr>
+    <a:masterClrMapping/>
+  </p:clrMapOvr>
+</p:sld>
+</file>
+
+<file path=ppt/slides/slide4.xml><?xml version="1.0" encoding="utf-8"?>
+<p:sld xmlns:a="http://schemas.openxmlformats.org/drawingml/2006/main" xmlns:r="http://schemas.openxmlformats.org/officeDocument/2006/relationships" xmlns:p="http://schemas.openxmlformats.org/presentationml/2006/main">
+  <p:cSld>
+    <p:spTree>
+      <p:nvGrpSpPr>
+        <p:cNvPr id="1" name=""/>
+        <p:cNvGrpSpPr/>
+        <p:nvPr/>
+      </p:nvGrpSpPr>
+      <p:grpSpPr>
+        <a:xfrm>
+          <a:off x="0" y="0"/>
+          <a:ext cx="0" cy="0"/>
+          <a:chOff x="0" y="0"/>
+          <a:chExt cx="0" cy="0"/>
+        </a:xfrm>
+      </p:grpSpPr>
+      <p:sp>
+        <p:nvSpPr>
+          <p:cNvPr id="2" name="Title 1">
+            <a:extLst>
+              <a:ext uri="{FF2B5EF4-FFF2-40B4-BE49-F238E27FC236}">
+                <a16:creationId xmlns:a16="http://schemas.microsoft.com/office/drawing/2014/main" id="{3583637B-5763-DD94-E8BE-FCD450DF3B15}"/>
+              </a:ext>
+            </a:extLst>
+          </p:cNvPr>
+          <p:cNvSpPr>
+            <a:spLocks noGrp="1"/>
+          </p:cNvSpPr>
+          <p:nvPr>
+            <p:ph type="title"/>
+          </p:nvPr>
+        </p:nvSpPr>
+        <p:spPr/>
+        <p:txBody>
+          <a:bodyPr/>
+          <a:lstStyle/>
+          <a:p>
+            <a:endParaRPr kumimoji="1" lang="ja-JP" altLang="en-US"/>
+          </a:p>
+        </p:txBody>
+      </p:sp>
+      <p:sp>
+        <p:nvSpPr>
+          <p:cNvPr id="3" name="Content Placeholder 2">
+            <a:extLst>
+              <a:ext uri="{FF2B5EF4-FFF2-40B4-BE49-F238E27FC236}">
+                <a16:creationId xmlns:a16="http://schemas.microsoft.com/office/drawing/2014/main" id="{64B29FFC-4AC0-13CB-1FA9-9FBC33C2C910}"/>
+              </a:ext>
+            </a:extLst>
+          </p:cNvPr>
+          <p:cNvSpPr>
+            <a:spLocks noGrp="1"/>
+          </p:cNvSpPr>
+          <p:nvPr>
+            <p:ph idx="1"/>
+          </p:nvPr>
+        </p:nvSpPr>
+        <p:spPr/>
+        <p:txBody>
+          <a:bodyPr/>
+          <a:lstStyle/>
+          <a:p>
+            <a:r>
+              <a:rPr kumimoji="1" lang="en-US" altLang="ja-JP" dirty="0"/>
+              <a:t>This is slide 4.</a:t>
+            </a:r>
+            <a:endParaRPr kumimoji="1" lang="ja-JP" altLang="en-US" dirty="0"/>
+          </a:p>
+        </p:txBody>
+      </p:sp>
+    </p:spTree>
+    <p:extLst>
+      <p:ext uri="{BB962C8B-B14F-4D97-AF65-F5344CB8AC3E}">
+        <p14:creationId xmlns:p14="http://schemas.microsoft.com/office/powerpoint/2010/main" val="3094147687"/>
+      </p:ext>
+    </p:extLst>
+  </p:cSld>
+  <p:clrMapOvr>
+    <a:masterClrMapping/>
+  </p:clrMapOvr>
+</p:sld>
+</file>
+
+<file path=ppt/slides/slide5.xml><?xml version="1.0" encoding="utf-8"?>
+<p:sld xmlns:a="http://schemas.openxmlformats.org/drawingml/2006/main" xmlns:r="http://schemas.openxmlformats.org/officeDocument/2006/relationships" xmlns:p="http://schemas.openxmlformats.org/presentationml/2006/main">
+  <p:cSld>
+    <p:spTree>
+      <p:nvGrpSpPr>
+        <p:cNvPr id="1" name=""/>
+        <p:cNvGrpSpPr/>
+        <p:nvPr/>
+      </p:nvGrpSpPr>
+      <p:grpSpPr>
+        <a:xfrm>
+          <a:off x="0" y="0"/>
+          <a:ext cx="0" cy="0"/>
+          <a:chOff x="0" y="0"/>
+          <a:chExt cx="0" cy="0"/>
+        </a:xfrm>
+      </p:grpSpPr>
+      <p:sp>
+        <p:nvSpPr>
+          <p:cNvPr id="2" name="Title 1">
+            <a:extLst>
+              <a:ext uri="{FF2B5EF4-FFF2-40B4-BE49-F238E27FC236}">
+                <a16:creationId xmlns:a16="http://schemas.microsoft.com/office/drawing/2014/main" id="{3583637B-5763-DD94-E8BE-FCD450DF3B15}"/>
+              </a:ext>
+            </a:extLst>
+          </p:cNvPr>
+          <p:cNvSpPr>
+            <a:spLocks noGrp="1"/>
+          </p:cNvSpPr>
+          <p:nvPr>
+            <p:ph type="title"/>
+          </p:nvPr>
+        </p:nvSpPr>
+        <p:spPr/>
+        <p:txBody>
+          <a:bodyPr/>
+          <a:lstStyle/>
+          <a:p>
+            <a:endParaRPr kumimoji="1" lang="ja-JP" altLang="en-US"/>
+          </a:p>
+        </p:txBody>
+      </p:sp>
+      <p:sp>
+        <p:nvSpPr>
+          <p:cNvPr id="3" name="Content Placeholder 2">
+            <a:extLst>
+              <a:ext uri="{FF2B5EF4-FFF2-40B4-BE49-F238E27FC236}">
+                <a16:creationId xmlns:a16="http://schemas.microsoft.com/office/drawing/2014/main" id="{64B29FFC-4AC0-13CB-1FA9-9FBC33C2C910}"/>
+              </a:ext>
+            </a:extLst>
+          </p:cNvPr>
+          <p:cNvSpPr>
+            <a:spLocks noGrp="1"/>
+          </p:cNvSpPr>
+          <p:nvPr>
+            <p:ph idx="1"/>
+          </p:nvPr>
+        </p:nvSpPr>
+        <p:spPr/>
+        <p:txBody>
+          <a:bodyPr/>
+          <a:lstStyle/>
+          <a:p>
+            <a:r>
+              <a:rPr kumimoji="1" lang="en-US" altLang="ja-JP" dirty="0"/>
+              <a:t>This is slide 5.</a:t>
+            </a:r>
+            <a:endParaRPr kumimoji="1" lang="ja-JP" altLang="en-US" dirty="0"/>
+          </a:p>
+        </p:txBody>
+      </p:sp>
+    </p:spTree>
+    <p:extLst>
+      <p:ext uri="{BB962C8B-B14F-4D97-AF65-F5344CB8AC3E}">
+        <p14:creationId xmlns:p14="http://schemas.microsoft.com/office/powerpoint/2010/main" val="328784442"/>
+      </p:ext>
+    </p:extLst>
+  </p:cSld>
+  <p:clrMapOvr>
+    <a:masterClrMapping/>
+  </p:clrMapOvr>
+</p:sld>
+</file>
+
+<file path=ppt/slides/slide6.xml><?xml version="1.0" encoding="utf-8"?>
+<p:sld xmlns:a="http://schemas.openxmlformats.org/drawingml/2006/main" xmlns:r="http://schemas.openxmlformats.org/officeDocument/2006/relationships" xmlns:p="http://schemas.openxmlformats.org/presentationml/2006/main">
+  <p:cSld>
+    <p:spTree>
+      <p:nvGrpSpPr>
+        <p:cNvPr id="1" name=""/>
+        <p:cNvGrpSpPr/>
+        <p:nvPr/>
+      </p:nvGrpSpPr>
+      <p:grpSpPr>
+        <a:xfrm>
+          <a:off x="0" y="0"/>
+          <a:ext cx="0" cy="0"/>
+          <a:chOff x="0" y="0"/>
+          <a:chExt cx="0" cy="0"/>
+        </a:xfrm>
+      </p:grpSpPr>
+      <p:sp>
+        <p:nvSpPr>
+          <p:cNvPr id="2" name="Title 1">
+            <a:extLst>
+              <a:ext uri="{FF2B5EF4-FFF2-40B4-BE49-F238E27FC236}">
+                <a16:creationId xmlns:a16="http://schemas.microsoft.com/office/drawing/2014/main" id="{3583637B-5763-DD94-E8BE-FCD450DF3B15}"/>
+              </a:ext>
+            </a:extLst>
+          </p:cNvPr>
+          <p:cNvSpPr>
+            <a:spLocks noGrp="1"/>
+          </p:cNvSpPr>
+          <p:nvPr>
+            <p:ph type="title"/>
+          </p:nvPr>
+        </p:nvSpPr>
+        <p:spPr/>
+        <p:txBody>
+          <a:bodyPr/>
+          <a:lstStyle/>
+          <a:p>
+            <a:endParaRPr kumimoji="1" lang="ja-JP" altLang="en-US"/>
+          </a:p>
+        </p:txBody>
+      </p:sp>
+      <p:sp>
+        <p:nvSpPr>
+          <p:cNvPr id="3" name="Content Placeholder 2">
+            <a:extLst>
+              <a:ext uri="{FF2B5EF4-FFF2-40B4-BE49-F238E27FC236}">
+                <a16:creationId xmlns:a16="http://schemas.microsoft.com/office/drawing/2014/main" id="{64B29FFC-4AC0-13CB-1FA9-9FBC33C2C910}"/>
+              </a:ext>
+            </a:extLst>
+          </p:cNvPr>
+          <p:cNvSpPr>
+            <a:spLocks noGrp="1"/>
+          </p:cNvSpPr>
+          <p:nvPr>
+            <p:ph idx="1"/>
+          </p:nvPr>
+        </p:nvSpPr>
+        <p:spPr/>
+        <p:txBody>
+          <a:bodyPr/>
+          <a:lstStyle/>
+          <a:p>
+            <a:r>
+              <a:rPr kumimoji="1" lang="en-US" altLang="ja-JP" dirty="0"/>
+              <a:t>This is slide 6.</a:t>
+            </a:r>
+            <a:endParaRPr kumimoji="1" lang="ja-JP" altLang="en-US" dirty="0"/>
+          </a:p>
+        </p:txBody>
+      </p:sp>
+    </p:spTree>
+    <p:extLst>
+      <p:ext uri="{BB962C8B-B14F-4D97-AF65-F5344CB8AC3E}">
+        <p14:creationId xmlns:p14="http://schemas.microsoft.com/office/powerpoint/2010/main" val="4005965881"/>
+      </p:ext>
+    </p:extLst>
+  </p:cSld>
+  <p:clrMapOvr>
+    <a:masterClrMapping/>
+  </p:clrMapOvr>
+</p:sld>
+</file>
+
+<file path=ppt/slides/slide7.xml><?xml version="1.0" encoding="utf-8"?>
+<p:sld xmlns:a="http://schemas.openxmlformats.org/drawingml/2006/main" xmlns:r="http://schemas.openxmlformats.org/officeDocument/2006/relationships" xmlns:p="http://schemas.openxmlformats.org/presentationml/2006/main">
+  <p:cSld>
+    <p:spTree>
+      <p:nvGrpSpPr>
+        <p:cNvPr id="1" name=""/>
+        <p:cNvGrpSpPr/>
+        <p:nvPr/>
+      </p:nvGrpSpPr>
+      <p:grpSpPr>
+        <a:xfrm>
+          <a:off x="0" y="0"/>
+          <a:ext cx="0" cy="0"/>
+          <a:chOff x="0" y="0"/>
+          <a:chExt cx="0" cy="0"/>
+        </a:xfrm>
+      </p:grpSpPr>
+      <p:sp>
+        <p:nvSpPr>
+          <p:cNvPr id="2" name="Title 1">
+            <a:extLst>
+              <a:ext uri="{FF2B5EF4-FFF2-40B4-BE49-F238E27FC236}">
+                <a16:creationId xmlns:a16="http://schemas.microsoft.com/office/drawing/2014/main" id="{3583637B-5763-DD94-E8BE-FCD450DF3B15}"/>
+              </a:ext>
+            </a:extLst>
+          </p:cNvPr>
+          <p:cNvSpPr>
+            <a:spLocks noGrp="1"/>
+          </p:cNvSpPr>
+          <p:nvPr>
+            <p:ph type="title"/>
+          </p:nvPr>
+        </p:nvSpPr>
+        <p:spPr/>
+        <p:txBody>
+          <a:bodyPr/>
+          <a:lstStyle/>
+          <a:p>
+            <a:endParaRPr kumimoji="1" lang="ja-JP" altLang="en-US"/>
+          </a:p>
+        </p:txBody>
+      </p:sp>
+      <p:sp>
+        <p:nvSpPr>
+          <p:cNvPr id="3" name="Content Placeholder 2">
+            <a:extLst>
+              <a:ext uri="{FF2B5EF4-FFF2-40B4-BE49-F238E27FC236}">
+                <a16:creationId xmlns:a16="http://schemas.microsoft.com/office/drawing/2014/main" id="{64B29FFC-4AC0-13CB-1FA9-9FBC33C2C910}"/>
+              </a:ext>
+            </a:extLst>
+          </p:cNvPr>
+          <p:cNvSpPr>
+            <a:spLocks noGrp="1"/>
+          </p:cNvSpPr>
+          <p:nvPr>
+            <p:ph idx="1"/>
+          </p:nvPr>
+        </p:nvSpPr>
+        <p:spPr/>
+        <p:txBody>
+          <a:bodyPr/>
+          <a:lstStyle/>
+          <a:p>
+            <a:r>
+              <a:rPr kumimoji="1" lang="en-US" altLang="ja-JP" dirty="0"/>
+              <a:t>This is slide 7.</a:t>
+            </a:r>
+            <a:endParaRPr kumimoji="1" lang="ja-JP" altLang="en-US" dirty="0"/>
+          </a:p>
+        </p:txBody>
+      </p:sp>
+    </p:spTree>
+    <p:extLst>
+      <p:ext uri="{BB962C8B-B14F-4D97-AF65-F5344CB8AC3E}">
+        <p14:creationId xmlns:p14="http://schemas.microsoft.com/office/powerpoint/2010/main" val="3224345658"/>
+      </p:ext>
+    </p:extLst>
+  </p:cSld>
+  <p:clrMapOvr>
+    <a:masterClrMapping/>
+  </p:clrMapOvr>
+</p:sld>
+</file>
+
+<file path=ppt/slides/slide8.xml><?xml version="1.0" encoding="utf-8"?>
+<p:sld xmlns:a="http://schemas.openxmlformats.org/drawingml/2006/main" xmlns:r="http://schemas.openxmlformats.org/officeDocument/2006/relationships" xmlns:p="http://schemas.openxmlformats.org/presentationml/2006/main">
+  <p:cSld>
+    <p:spTree>
+      <p:nvGrpSpPr>
+        <p:cNvPr id="1" name=""/>
+        <p:cNvGrpSpPr/>
+        <p:nvPr/>
+      </p:nvGrpSpPr>
+      <p:grpSpPr>
+        <a:xfrm>
+          <a:off x="0" y="0"/>
+          <a:ext cx="0" cy="0"/>
+          <a:chOff x="0" y="0"/>
+          <a:chExt cx="0" cy="0"/>
+        </a:xfrm>
+      </p:grpSpPr>
+      <p:sp>
+        <p:nvSpPr>
+          <p:cNvPr id="2" name="Title 1">
+            <a:extLst>
+              <a:ext uri="{FF2B5EF4-FFF2-40B4-BE49-F238E27FC236}">
+                <a16:creationId xmlns:a16="http://schemas.microsoft.com/office/drawing/2014/main" id="{3583637B-5763-DD94-E8BE-FCD450DF3B15}"/>
+              </a:ext>
+            </a:extLst>
+          </p:cNvPr>
+          <p:cNvSpPr>
+            <a:spLocks noGrp="1"/>
+          </p:cNvSpPr>
+          <p:nvPr>
+            <p:ph type="title"/>
+          </p:nvPr>
+        </p:nvSpPr>
+        <p:spPr/>
+        <p:txBody>
+          <a:bodyPr/>
+          <a:lstStyle/>
+          <a:p>
+            <a:endParaRPr kumimoji="1" lang="ja-JP" altLang="en-US"/>
+          </a:p>
+        </p:txBody>
+      </p:sp>
+      <p:sp>
+        <p:nvSpPr>
+          <p:cNvPr id="3" name="Content Placeholder 2">
+            <a:extLst>
+              <a:ext uri="{FF2B5EF4-FFF2-40B4-BE49-F238E27FC236}">
+                <a16:creationId xmlns:a16="http://schemas.microsoft.com/office/drawing/2014/main" id="{64B29FFC-4AC0-13CB-1FA9-9FBC33C2C910}"/>
+              </a:ext>
+            </a:extLst>
+          </p:cNvPr>
+          <p:cNvSpPr>
+            <a:spLocks noGrp="1"/>
+          </p:cNvSpPr>
+          <p:nvPr>
+            <p:ph idx="1"/>
+          </p:nvPr>
+        </p:nvSpPr>
+        <p:spPr/>
+        <p:txBody>
+          <a:bodyPr/>
+          <a:lstStyle/>
+          <a:p>
+            <a:r>
+              <a:rPr kumimoji="1" lang="en-US" altLang="ja-JP" dirty="0"/>
+              <a:t>This is slide 8.</a:t>
+            </a:r>
+            <a:endParaRPr kumimoji="1" lang="ja-JP" altLang="en-US" dirty="0"/>
+          </a:p>
+        </p:txBody>
+      </p:sp>
+    </p:spTree>
+    <p:extLst>
+      <p:ext uri="{BB962C8B-B14F-4D97-AF65-F5344CB8AC3E}">
+        <p14:creationId xmlns:p14="http://schemas.microsoft.com/office/powerpoint/2010/main" val="3126950445"/>
+      </p:ext>
+    </p:extLst>
+  </p:cSld>
+  <p:clrMapOvr>
+    <a:masterClrMapping/>
+  </p:clrMapOvr>
+</p:sld>
+</file>
+
+<file path=ppt/slides/slide9.xml><?xml version="1.0" encoding="utf-8"?>
+<p:sld xmlns:a="http://schemas.openxmlformats.org/drawingml/2006/main" xmlns:r="http://schemas.openxmlformats.org/officeDocument/2006/relationships" xmlns:p="http://schemas.openxmlformats.org/presentationml/2006/main">
+  <p:cSld>
+    <p:spTree>
+      <p:nvGrpSpPr>
+        <p:cNvPr id="1" name=""/>
+        <p:cNvGrpSpPr/>
+        <p:nvPr/>
+      </p:nvGrpSpPr>
+      <p:grpSpPr>
+        <a:xfrm>
+          <a:off x="0" y="0"/>
+          <a:ext cx="0" cy="0"/>
+          <a:chOff x="0" y="0"/>
+          <a:chExt cx="0" cy="0"/>
+        </a:xfrm>
+      </p:grpSpPr>
+      <p:sp>
+        <p:nvSpPr>
+          <p:cNvPr id="2" name="Title 1">
+            <a:extLst>
+              <a:ext uri="{FF2B5EF4-FFF2-40B4-BE49-F238E27FC236}">
+                <a16:creationId xmlns:a16="http://schemas.microsoft.com/office/drawing/2014/main" id="{3583637B-5763-DD94-E8BE-FCD450DF3B15}"/>
+              </a:ext>
+            </a:extLst>
+          </p:cNvPr>
+          <p:cNvSpPr>
+            <a:spLocks noGrp="1"/>
+          </p:cNvSpPr>
+          <p:nvPr>
+            <p:ph type="title"/>
+          </p:nvPr>
+        </p:nvSpPr>
+        <p:spPr/>
+        <p:txBody>
+          <a:bodyPr/>
+          <a:lstStyle/>
+          <a:p>
+            <a:endParaRPr kumimoji="1" lang="ja-JP" altLang="en-US"/>
+          </a:p>
+        </p:txBody>
+      </p:sp>
+      <p:sp>
+        <p:nvSpPr>
+          <p:cNvPr id="3" name="Content Placeholder 2">
+            <a:extLst>
+              <a:ext uri="{FF2B5EF4-FFF2-40B4-BE49-F238E27FC236}">
+                <a16:creationId xmlns:a16="http://schemas.microsoft.com/office/drawing/2014/main" id="{64B29FFC-4AC0-13CB-1FA9-9FBC33C2C910}"/>
+              </a:ext>
+            </a:extLst>
+          </p:cNvPr>
+          <p:cNvSpPr>
+            <a:spLocks noGrp="1"/>
+          </p:cNvSpPr>
+          <p:nvPr>
+            <p:ph idx="1"/>
+          </p:nvPr>
+        </p:nvSpPr>
+        <p:spPr/>
+        <p:txBody>
+          <a:bodyPr/>
+          <a:lstStyle/>
+          <a:p>
+            <a:r>
+              <a:rPr kumimoji="1" lang="en-US" altLang="ja-JP" dirty="0"/>
+              <a:t>This is slide 9.</a:t>
+            </a:r>
+            <a:endParaRPr kumimoji="1" lang="ja-JP" altLang="en-US" dirty="0"/>
+          </a:p>
+        </p:txBody>
+      </p:sp>
+    </p:spTree>
+    <p:extLst>
+      <p:ext uri="{BB962C8B-B14F-4D97-AF65-F5344CB8AC3E}">
+        <p14:creationId xmlns:p14="http://schemas.microsoft.com/office/powerpoint/2010/main" val="2662861258"/>
       </p:ext>
     </p:extLst>
   </p:cSld>

</xml_diff>